<commit_message>
update readme file and clear files
</commit_message>
<xml_diff>
--- a/docs/presontation.pptx
+++ b/docs/presontation.pptx
@@ -271,7 +271,7 @@
           <a:p>
             <a:fld id="{2A630E2C-305C-4027-BD8C-4A7E78B9954E}" type="datetimeFigureOut">
               <a:rPr lang="en-US" smtClean="0"/>
-              <a:t>6/26/2022</a:t>
+              <a:t>6/27/2022</a:t>
             </a:fld>
             <a:endParaRPr lang="en-US"/>
           </a:p>
@@ -469,7 +469,7 @@
           <a:p>
             <a:fld id="{2A630E2C-305C-4027-BD8C-4A7E78B9954E}" type="datetimeFigureOut">
               <a:rPr lang="en-US" smtClean="0"/>
-              <a:t>6/26/2022</a:t>
+              <a:t>6/27/2022</a:t>
             </a:fld>
             <a:endParaRPr lang="en-US"/>
           </a:p>
@@ -677,7 +677,7 @@
           <a:p>
             <a:fld id="{2A630E2C-305C-4027-BD8C-4A7E78B9954E}" type="datetimeFigureOut">
               <a:rPr lang="en-US" smtClean="0"/>
-              <a:t>6/26/2022</a:t>
+              <a:t>6/27/2022</a:t>
             </a:fld>
             <a:endParaRPr lang="en-US"/>
           </a:p>
@@ -875,7 +875,7 @@
           <a:p>
             <a:fld id="{2A630E2C-305C-4027-BD8C-4A7E78B9954E}" type="datetimeFigureOut">
               <a:rPr lang="en-US" smtClean="0"/>
-              <a:t>6/26/2022</a:t>
+              <a:t>6/27/2022</a:t>
             </a:fld>
             <a:endParaRPr lang="en-US"/>
           </a:p>
@@ -1150,7 +1150,7 @@
           <a:p>
             <a:fld id="{2A630E2C-305C-4027-BD8C-4A7E78B9954E}" type="datetimeFigureOut">
               <a:rPr lang="en-US" smtClean="0"/>
-              <a:t>6/26/2022</a:t>
+              <a:t>6/27/2022</a:t>
             </a:fld>
             <a:endParaRPr lang="en-US"/>
           </a:p>
@@ -1415,7 +1415,7 @@
           <a:p>
             <a:fld id="{2A630E2C-305C-4027-BD8C-4A7E78B9954E}" type="datetimeFigureOut">
               <a:rPr lang="en-US" smtClean="0"/>
-              <a:t>6/26/2022</a:t>
+              <a:t>6/27/2022</a:t>
             </a:fld>
             <a:endParaRPr lang="en-US"/>
           </a:p>
@@ -1827,7 +1827,7 @@
           <a:p>
             <a:fld id="{2A630E2C-305C-4027-BD8C-4A7E78B9954E}" type="datetimeFigureOut">
               <a:rPr lang="en-US" smtClean="0"/>
-              <a:t>6/26/2022</a:t>
+              <a:t>6/27/2022</a:t>
             </a:fld>
             <a:endParaRPr lang="en-US"/>
           </a:p>
@@ -1968,7 +1968,7 @@
           <a:p>
             <a:fld id="{2A630E2C-305C-4027-BD8C-4A7E78B9954E}" type="datetimeFigureOut">
               <a:rPr lang="en-US" smtClean="0"/>
-              <a:t>6/26/2022</a:t>
+              <a:t>6/27/2022</a:t>
             </a:fld>
             <a:endParaRPr lang="en-US"/>
           </a:p>
@@ -2081,7 +2081,7 @@
           <a:p>
             <a:fld id="{2A630E2C-305C-4027-BD8C-4A7E78B9954E}" type="datetimeFigureOut">
               <a:rPr lang="en-US" smtClean="0"/>
-              <a:t>6/26/2022</a:t>
+              <a:t>6/27/2022</a:t>
             </a:fld>
             <a:endParaRPr lang="en-US"/>
           </a:p>
@@ -2392,7 +2392,7 @@
           <a:p>
             <a:fld id="{2A630E2C-305C-4027-BD8C-4A7E78B9954E}" type="datetimeFigureOut">
               <a:rPr lang="en-US" smtClean="0"/>
-              <a:t>6/26/2022</a:t>
+              <a:t>6/27/2022</a:t>
             </a:fld>
             <a:endParaRPr lang="en-US"/>
           </a:p>
@@ -2680,7 +2680,7 @@
           <a:p>
             <a:fld id="{2A630E2C-305C-4027-BD8C-4A7E78B9954E}" type="datetimeFigureOut">
               <a:rPr lang="en-US" smtClean="0"/>
-              <a:t>6/26/2022</a:t>
+              <a:t>6/27/2022</a:t>
             </a:fld>
             <a:endParaRPr lang="en-US"/>
           </a:p>
@@ -2921,7 +2921,7 @@
           <a:p>
             <a:fld id="{2A630E2C-305C-4027-BD8C-4A7E78B9954E}" type="datetimeFigureOut">
               <a:rPr lang="en-US" smtClean="0"/>
-              <a:t>6/26/2022</a:t>
+              <a:t>6/27/2022</a:t>
             </a:fld>
             <a:endParaRPr lang="en-US"/>
           </a:p>
@@ -3451,7 +3451,27 @@
                 <a:latin typeface="Arial" panose="020B0604020202020204" pitchFamily="34" charset="0"/>
                 <a:cs typeface="Arial" panose="020B0604020202020204" pitchFamily="34" charset="0"/>
               </a:rPr>
-              <a:t>BUILDING AN EMPLOYEE MANAGER WEBSITE</a:t>
+              <a:t>BUILDING AN EMPLOYEE </a:t>
+            </a:r>
+            <a:r>
+              <a:rPr lang="en-US" sz="2800" b="1" dirty="0" smtClean="0">
+                <a:solidFill>
+                  <a:srgbClr val="0070C0"/>
+                </a:solidFill>
+                <a:latin typeface="Arial" panose="020B0604020202020204" pitchFamily="34" charset="0"/>
+                <a:cs typeface="Arial" panose="020B0604020202020204" pitchFamily="34" charset="0"/>
+              </a:rPr>
+              <a:t>MANAGE </a:t>
+            </a:r>
+            <a:r>
+              <a:rPr lang="en-US" sz="2800" b="1" dirty="0">
+                <a:solidFill>
+                  <a:srgbClr val="0070C0"/>
+                </a:solidFill>
+                <a:latin typeface="Arial" panose="020B0604020202020204" pitchFamily="34" charset="0"/>
+                <a:cs typeface="Arial" panose="020B0604020202020204" pitchFamily="34" charset="0"/>
+              </a:rPr>
+              <a:t>WEBSITE</a:t>
             </a:r>
             <a:br>
               <a:rPr lang="en-US" sz="2800" b="1" dirty="0">
@@ -8393,6 +8413,13 @@
   <p:clrMapOvr>
     <a:masterClrMapping/>
   </p:clrMapOvr>
+  <p:timing>
+    <p:tnLst>
+      <p:par>
+        <p:cTn id="1" dur="indefinite" restart="never" nodeType="tmRoot"/>
+      </p:par>
+    </p:tnLst>
+  </p:timing>
 </p:sld>
 </file>
 
@@ -10364,6 +10391,13 @@
   <p:clrMapOvr>
     <a:masterClrMapping/>
   </p:clrMapOvr>
+  <p:timing>
+    <p:tnLst>
+      <p:par>
+        <p:cTn id="1" dur="indefinite" restart="never" nodeType="tmRoot"/>
+      </p:par>
+    </p:tnLst>
+  </p:timing>
 </p:sld>
 </file>
 
@@ -10789,6 +10823,13 @@
   <p:clrMapOvr>
     <a:masterClrMapping/>
   </p:clrMapOvr>
+  <p:timing>
+    <p:tnLst>
+      <p:par>
+        <p:cTn id="1" dur="indefinite" restart="never" nodeType="tmRoot"/>
+      </p:par>
+    </p:tnLst>
+  </p:timing>
 </p:sld>
 </file>
 
@@ -17182,8 +17223,8 @@
         </p:nvSpPr>
         <p:spPr>
           <a:xfrm>
-            <a:off x="6646704" y="5246959"/>
-            <a:ext cx="1653236" cy="407109"/>
+            <a:off x="6385169" y="5246959"/>
+            <a:ext cx="1914771" cy="407109"/>
           </a:xfrm>
           <a:prstGeom prst="roundRect">
             <a:avLst/>
@@ -17502,8 +17543,8 @@
         </p:nvSpPr>
         <p:spPr>
           <a:xfrm rot="16200000">
-            <a:off x="-93720" y="4310917"/>
-            <a:ext cx="1080535" cy="358168"/>
+            <a:off x="-187608" y="4404805"/>
+            <a:ext cx="1268311" cy="358168"/>
           </a:xfrm>
           <a:prstGeom prst="roundRect">
             <a:avLst/>
@@ -18033,8 +18074,8 @@
         </p:nvSpPr>
         <p:spPr>
           <a:xfrm>
-            <a:off x="4248886" y="3865779"/>
-            <a:ext cx="549538" cy="406400"/>
+            <a:off x="4295776" y="3941918"/>
+            <a:ext cx="436015" cy="322446"/>
           </a:xfrm>
           <a:prstGeom prst="roundRect">
             <a:avLst/>
@@ -18100,7 +18141,7 @@
           <a:lstStyle/>
           <a:p>
             <a:r>
-              <a:rPr lang="en-US" sz="1200">
+              <a:rPr lang="en-US" sz="1200" dirty="0">
                 <a:solidFill>
                   <a:srgbClr val="454F5B"/>
                 </a:solidFill>
@@ -18110,14 +18151,6 @@
               </a:rPr>
               <a:t>Sort employees by column</a:t>
             </a:r>
-            <a:endParaRPr lang="en-US" sz="1200" dirty="0">
-              <a:solidFill>
-                <a:srgbClr val="454F5B"/>
-              </a:solidFill>
-              <a:latin typeface="Arial" panose="020B0604020202020204" pitchFamily="34" charset="0"/>
-              <a:ea typeface="Montserrat"/>
-              <a:cs typeface="Arial" panose="020B0604020202020204" pitchFamily="34" charset="0"/>
-            </a:endParaRPr>
           </a:p>
         </p:txBody>
       </p:sp>
@@ -18138,8 +18171,8 @@
         </p:nvCxnSpPr>
         <p:spPr>
           <a:xfrm flipV="1">
-            <a:off x="4798424" y="3214843"/>
-            <a:ext cx="1037434" cy="854136"/>
+            <a:off x="4731791" y="3214843"/>
+            <a:ext cx="1104067" cy="888298"/>
           </a:xfrm>
           <a:prstGeom prst="curvedConnector3">
             <a:avLst/>

</xml_diff>